<commit_message>
Support ppt and pdf, fix TM calculation in lesson 24
</commit_message>
<xml_diff>
--- a/Bai 24 Phan tich lien ket, PageRank.pptx
+++ b/Bai 24 Phan tich lien ket, PageRank.pptx
@@ -175,7 +175,7 @@
   </p:defaultTextStyle>
   <p:extLst>
     <p:ext uri="{EFAFB233-063F-42B5-8137-9DF3F51BA10A}">
-      <p15:sldGuideLst xmlns="" xmlns:p15="http://schemas.microsoft.com/office/powerpoint/2012/main">
+      <p15:sldGuideLst xmlns:p15="http://schemas.microsoft.com/office/powerpoint/2012/main" xmlns="">
         <p15:guide id="1" orient="horz" pos="2160">
           <p15:clr>
             <a:srgbClr val="A4A3A4"/>
@@ -189,7 +189,7 @@
       </p15:sldGuideLst>
     </p:ext>
     <p:ext uri="{2D200454-40CA-4A62-9FC3-DE9A4176ACB9}">
-      <p15:notesGuideLst xmlns="" xmlns:p15="http://schemas.microsoft.com/office/powerpoint/2012/main">
+      <p15:notesGuideLst xmlns:p15="http://schemas.microsoft.com/office/powerpoint/2012/main" xmlns="">
         <p15:guide id="1" orient="horz" pos="2880">
           <p15:clr>
             <a:srgbClr val="A4A3A4"/>
@@ -10402,8 +10402,8 @@
           </a:p>
         </p:txBody>
       </p:sp>
-      <mc:AlternateContent xmlns:mc="http://schemas.openxmlformats.org/markup-compatibility/2006">
-        <mc:Choice xmlns:a14="http://schemas.microsoft.com/office/drawing/2010/main" Requires="a14">
+      <mc:AlternateContent xmlns:mc="http://schemas.openxmlformats.org/markup-compatibility/2006" xmlns:a14="http://schemas.microsoft.com/office/drawing/2010/main">
+        <mc:Choice Requires="a14">
           <p:sp>
             <p:nvSpPr>
               <p:cNvPr id="844803" name="Rectangle 3"/>
@@ -10731,7 +10731,6 @@
                   <a:rPr lang="en-US" sz="1600" dirty="0" smtClean="0"/>
                   <a:t>.</a:t>
                 </a:r>
-                <a:endParaRPr lang="en-US" sz="1600" dirty="0" smtClean="0"/>
               </a:p>
               <a:p>
                 <a:pPr lvl="2"/>
@@ -11151,7 +11150,7 @@
             </p:txBody>
           </p:sp>
         </mc:Choice>
-        <mc:Fallback>
+        <mc:Fallback xmlns="">
           <p:sp>
             <p:nvSpPr>
               <p:cNvPr id="844803" name="Rectangle 3"/>
@@ -11698,7 +11697,7 @@
           <a:graphicData uri="http://schemas.openxmlformats.org/presentationml/2006/ole">
             <mc:AlternateContent xmlns:mc="http://schemas.openxmlformats.org/markup-compatibility/2006">
               <mc:Choice xmlns:v="urn:schemas-microsoft-com:vml" Requires="v">
-                <p:oleObj spid="_x0000_s865504" name="Vergelijking" r:id="rId3" imgW="711000" imgH="304560" progId="Equation.3">
+                <p:oleObj spid="_x0000_s865508" name="Vergelijking" r:id="rId3" imgW="711000" imgH="304560" progId="Equation.3">
                   <p:embed/>
                 </p:oleObj>
               </mc:Choice>
@@ -15496,14 +15495,14 @@
           <p:nvPr>
             <p:extLst>
               <p:ext uri="{D42A27DB-BD31-4B8C-83A1-F6EECF244321}">
-                <p14:modId xmlns:p14="http://schemas.microsoft.com/office/powerpoint/2010/main" val="2953521246"/>
+                <p14:modId xmlns:p14="http://schemas.microsoft.com/office/powerpoint/2010/main" val="2451457106"/>
               </p:ext>
             </p:extLst>
           </p:nvPr>
         </p:nvGraphicFramePr>
         <p:xfrm>
           <a:off x="571500" y="1785938"/>
-          <a:ext cx="6858048" cy="3972880"/>
+          <a:ext cx="8248973" cy="4040452"/>
         </p:xfrm>
         <a:graphic>
           <a:graphicData uri="http://schemas.openxmlformats.org/drawingml/2006/table">
@@ -15512,16 +15511,16 @@
                 <a:tableStyleId>{2D5ABB26-0587-4C30-8999-92F81FD0307C}</a:tableStyleId>
               </a:tblPr>
               <a:tblGrid>
-                <a:gridCol w="857256"/>
-                <a:gridCol w="857256"/>
-                <a:gridCol w="857273"/>
-                <a:gridCol w="857239"/>
-                <a:gridCol w="857256"/>
-                <a:gridCol w="857256"/>
-                <a:gridCol w="857256"/>
-                <a:gridCol w="857256"/>
+                <a:gridCol w="1031122"/>
+                <a:gridCol w="1031122"/>
+                <a:gridCol w="1031141"/>
+                <a:gridCol w="1031100"/>
+                <a:gridCol w="1031122"/>
+                <a:gridCol w="1031122"/>
+                <a:gridCol w="1031122"/>
+                <a:gridCol w="1031122"/>
               </a:tblGrid>
-              <a:tr h="496610">
+              <a:tr h="507577">
                 <a:tc>
                   <a:txBody>
                     <a:bodyPr/>
@@ -15667,7 +15666,7 @@
                   <a:tcPr/>
                 </a:tc>
               </a:tr>
-              <a:tr h="496610">
+              <a:tr h="487413">
                 <a:tc>
                   <a:txBody>
                     <a:bodyPr/>
@@ -15694,8 +15693,8 @@
                     <a:p>
                       <a:pPr lvl="0" algn="ctr"/>
                       <a:r>
-                        <a:rPr lang="de-DE" sz="2400" dirty="0" smtClean="0"/>
-                        <a:t>0.02</a:t>
+                        <a:rPr lang="de-DE" sz="2400" smtClean="0"/>
+                        <a:t>0.014</a:t>
                       </a:r>
                       <a:endParaRPr lang="de-DE" sz="2400" dirty="0"/>
                     </a:p>
@@ -15709,8 +15708,8 @@
                     <a:p>
                       <a:pPr lvl="0" algn="ctr"/>
                       <a:r>
-                        <a:rPr lang="de-DE" sz="2400" dirty="0" smtClean="0"/>
-                        <a:t>0.02</a:t>
+                        <a:rPr lang="de-DE" sz="2400" smtClean="0"/>
+                        <a:t>0.014</a:t>
                       </a:r>
                       <a:endParaRPr lang="de-DE" sz="2400" dirty="0"/>
                     </a:p>
@@ -15724,8 +15723,8 @@
                     <a:p>
                       <a:pPr lvl="0" algn="ctr"/>
                       <a:r>
-                        <a:rPr lang="de-DE" sz="2400" dirty="0" smtClean="0"/>
-                        <a:t>0.88</a:t>
+                        <a:rPr lang="de-DE" sz="2400" smtClean="0"/>
+                        <a:t>0.914</a:t>
                       </a:r>
                       <a:endParaRPr lang="de-DE" sz="2400" dirty="0"/>
                     </a:p>
@@ -15739,8 +15738,8 @@
                     <a:p>
                       <a:pPr lvl="0" algn="ctr"/>
                       <a:r>
-                        <a:rPr lang="de-DE" sz="2400" dirty="0" smtClean="0"/>
-                        <a:t>0.02</a:t>
+                        <a:rPr lang="de-DE" sz="2400" smtClean="0"/>
+                        <a:t>0.014</a:t>
                       </a:r>
                       <a:endParaRPr lang="de-DE" sz="2400" dirty="0"/>
                     </a:p>
@@ -15754,8 +15753,8 @@
                     <a:p>
                       <a:pPr lvl="0" algn="ctr"/>
                       <a:r>
-                        <a:rPr lang="de-DE" sz="2400" dirty="0" smtClean="0"/>
-                        <a:t>0.02</a:t>
+                        <a:rPr lang="de-DE" sz="2400" smtClean="0"/>
+                        <a:t>0.014</a:t>
                       </a:r>
                       <a:endParaRPr lang="de-DE" sz="2400" dirty="0"/>
                     </a:p>
@@ -15769,8 +15768,8 @@
                     <a:p>
                       <a:pPr lvl="0" algn="ctr"/>
                       <a:r>
-                        <a:rPr lang="de-DE" sz="2400" dirty="0" smtClean="0"/>
-                        <a:t>0.02</a:t>
+                        <a:rPr lang="de-DE" sz="2400" smtClean="0"/>
+                        <a:t>0.014</a:t>
                       </a:r>
                       <a:endParaRPr lang="de-DE" sz="2400" dirty="0"/>
                     </a:p>
@@ -15784,8 +15783,8 @@
                     <a:p>
                       <a:pPr lvl="0" algn="ctr"/>
                       <a:r>
-                        <a:rPr lang="de-DE" sz="2400" dirty="0" smtClean="0"/>
-                        <a:t>0.02</a:t>
+                        <a:rPr lang="de-DE" sz="2400" smtClean="0"/>
+                        <a:t>0.014</a:t>
                       </a:r>
                       <a:endParaRPr lang="de-DE" sz="2400" dirty="0"/>
                     </a:p>
@@ -15793,7 +15792,7 @@
                   <a:tcPr/>
                 </a:tc>
               </a:tr>
-              <a:tr h="496610">
+              <a:tr h="507577">
                 <a:tc>
                   <a:txBody>
                     <a:bodyPr/>
@@ -15836,9 +15835,10 @@
                         <a:defRPr/>
                       </a:pPr>
                       <a:r>
-                        <a:rPr lang="de-DE" sz="2400" dirty="0" smtClean="0"/>
-                        <a:t>0.02</a:t>
+                        <a:rPr lang="de-DE" sz="2400" smtClean="0"/>
+                        <a:t>0.014</a:t>
                       </a:r>
+                      <a:endParaRPr lang="de-DE" sz="2400" dirty="0" smtClean="0"/>
                     </a:p>
                   </a:txBody>
                   <a:tcPr/>
@@ -15866,9 +15866,10 @@
                         <a:defRPr/>
                       </a:pPr>
                       <a:r>
-                        <a:rPr lang="de-DE" sz="2400" dirty="0" smtClean="0"/>
-                        <a:t>0.45</a:t>
+                        <a:rPr lang="de-DE" sz="2400" smtClean="0"/>
+                        <a:t>0.464</a:t>
                       </a:r>
+                      <a:endParaRPr lang="de-DE" sz="2400" dirty="0" smtClean="0"/>
                     </a:p>
                   </a:txBody>
                   <a:tcPr/>
@@ -15880,8 +15881,8 @@
                     <a:p>
                       <a:pPr lvl="0" algn="ctr"/>
                       <a:r>
-                        <a:rPr lang="de-DE" sz="2400" dirty="0" smtClean="0"/>
-                        <a:t>0.45</a:t>
+                        <a:rPr lang="de-DE" sz="2400" smtClean="0"/>
+                        <a:t>0.464</a:t>
                       </a:r>
                       <a:endParaRPr lang="de-DE" sz="2400" dirty="0"/>
                     </a:p>
@@ -15895,8 +15896,8 @@
                     <a:p>
                       <a:pPr lvl="0" algn="ctr"/>
                       <a:r>
-                        <a:rPr lang="de-DE" sz="2400" dirty="0" smtClean="0"/>
-                        <a:t>0.02</a:t>
+                        <a:rPr lang="de-DE" sz="2400" smtClean="0"/>
+                        <a:t>0.014</a:t>
                       </a:r>
                       <a:endParaRPr lang="de-DE" sz="2400" dirty="0"/>
                     </a:p>
@@ -15910,8 +15911,8 @@
                     <a:p>
                       <a:pPr lvl="0" algn="ctr"/>
                       <a:r>
-                        <a:rPr lang="de-DE" sz="2400" dirty="0" smtClean="0"/>
-                        <a:t>0.02</a:t>
+                        <a:rPr lang="de-DE" sz="2400" smtClean="0"/>
+                        <a:t>0.014</a:t>
                       </a:r>
                       <a:endParaRPr lang="de-DE" sz="2400" dirty="0"/>
                     </a:p>
@@ -15925,8 +15926,8 @@
                     <a:p>
                       <a:pPr lvl="0" algn="ctr"/>
                       <a:r>
-                        <a:rPr lang="de-DE" sz="2400" dirty="0" smtClean="0"/>
-                        <a:t>0.02</a:t>
+                        <a:rPr lang="de-DE" sz="2400" smtClean="0"/>
+                        <a:t>0.014</a:t>
                       </a:r>
                       <a:endParaRPr lang="de-DE" sz="2400" dirty="0"/>
                     </a:p>
@@ -15940,8 +15941,8 @@
                     <a:p>
                       <a:pPr lvl="0" algn="ctr"/>
                       <a:r>
-                        <a:rPr lang="de-DE" sz="2400" dirty="0" smtClean="0"/>
-                        <a:t>0.02</a:t>
+                        <a:rPr lang="de-DE" sz="2400" smtClean="0"/>
+                        <a:t>0.014</a:t>
                       </a:r>
                       <a:endParaRPr lang="de-DE" sz="2400" dirty="0"/>
                     </a:p>
@@ -15949,7 +15950,7 @@
                   <a:tcPr/>
                 </a:tc>
               </a:tr>
-              <a:tr h="496610">
+              <a:tr h="507577">
                 <a:tc>
                   <a:txBody>
                     <a:bodyPr/>
@@ -15976,8 +15977,8 @@
                     <a:p>
                       <a:pPr lvl="0" algn="ctr"/>
                       <a:r>
-                        <a:rPr lang="de-DE" sz="2400" dirty="0" smtClean="0"/>
-                        <a:t>0.31</a:t>
+                        <a:rPr lang="de-DE" sz="2400" smtClean="0"/>
+                        <a:t>0.314</a:t>
                       </a:r>
                       <a:endParaRPr lang="de-DE" sz="2400" dirty="0"/>
                     </a:p>
@@ -15991,8 +15992,8 @@
                     <a:p>
                       <a:pPr lvl="0" algn="ctr"/>
                       <a:r>
-                        <a:rPr lang="de-DE" sz="2400" dirty="0" smtClean="0"/>
-                        <a:t>0.02</a:t>
+                        <a:rPr lang="de-DE" sz="2400" smtClean="0"/>
+                        <a:t>0.014</a:t>
                       </a:r>
                       <a:endParaRPr lang="de-DE" sz="2400" dirty="0"/>
                     </a:p>
@@ -16006,8 +16007,8 @@
                     <a:p>
                       <a:pPr lvl="0" algn="ctr"/>
                       <a:r>
-                        <a:rPr lang="de-DE" sz="2400" dirty="0" smtClean="0"/>
-                        <a:t>0.31</a:t>
+                        <a:rPr lang="de-DE" sz="2400" smtClean="0"/>
+                        <a:t>0.314</a:t>
                       </a:r>
                       <a:endParaRPr lang="de-DE" sz="2400" dirty="0"/>
                     </a:p>
@@ -16021,8 +16022,8 @@
                     <a:p>
                       <a:pPr lvl="0" algn="ctr"/>
                       <a:r>
-                        <a:rPr lang="de-DE" sz="2400" dirty="0" smtClean="0"/>
-                        <a:t>0.31</a:t>
+                        <a:rPr lang="de-DE" sz="2400" smtClean="0"/>
+                        <a:t>0.314</a:t>
                       </a:r>
                       <a:endParaRPr lang="de-DE" sz="2400" dirty="0"/>
                     </a:p>
@@ -16036,8 +16037,8 @@
                     <a:p>
                       <a:pPr lvl="0" algn="ctr"/>
                       <a:r>
-                        <a:rPr lang="de-DE" sz="2400" dirty="0" smtClean="0"/>
-                        <a:t>0.02</a:t>
+                        <a:rPr lang="de-DE" sz="2400" smtClean="0"/>
+                        <a:t>0.014</a:t>
                       </a:r>
                       <a:endParaRPr lang="de-DE" sz="2400" dirty="0"/>
                     </a:p>
@@ -16051,8 +16052,8 @@
                     <a:p>
                       <a:pPr lvl="0" algn="ctr"/>
                       <a:r>
-                        <a:rPr lang="de-DE" sz="2400" dirty="0" smtClean="0"/>
-                        <a:t>0.02</a:t>
+                        <a:rPr lang="de-DE" sz="2400" smtClean="0"/>
+                        <a:t>0.014</a:t>
                       </a:r>
                       <a:endParaRPr lang="de-DE" sz="2400" dirty="0"/>
                     </a:p>
@@ -16066,8 +16067,8 @@
                     <a:p>
                       <a:pPr lvl="0" algn="ctr"/>
                       <a:r>
-                        <a:rPr lang="de-DE" sz="2400" dirty="0" smtClean="0"/>
-                        <a:t>0.02</a:t>
+                        <a:rPr lang="de-DE" sz="2400" smtClean="0"/>
+                        <a:t>0.014</a:t>
                       </a:r>
                       <a:endParaRPr lang="de-DE" sz="2400" dirty="0"/>
                     </a:p>
@@ -16075,7 +16076,7 @@
                   <a:tcPr/>
                 </a:tc>
               </a:tr>
-              <a:tr h="496610">
+              <a:tr h="507577">
                 <a:tc>
                   <a:txBody>
                     <a:bodyPr/>
@@ -16102,9 +16103,10 @@
                     <a:p>
                       <a:pPr lvl="0" algn="ctr"/>
                       <a:r>
-                        <a:rPr lang="de-DE" sz="2400" dirty="0" smtClean="0"/>
-                        <a:t>0.02</a:t>
+                        <a:rPr lang="de-DE" sz="2400" smtClean="0"/>
+                        <a:t>0.014</a:t>
                       </a:r>
+                      <a:endParaRPr lang="de-DE" sz="2400" dirty="0" smtClean="0"/>
                     </a:p>
                   </a:txBody>
                   <a:tcPr/>
@@ -16116,8 +16118,8 @@
                     <a:p>
                       <a:pPr lvl="0" algn="ctr"/>
                       <a:r>
-                        <a:rPr lang="de-DE" sz="2400" dirty="0" smtClean="0"/>
-                        <a:t>0.02</a:t>
+                        <a:rPr lang="de-DE" sz="2400" smtClean="0"/>
+                        <a:t>0.014</a:t>
                       </a:r>
                       <a:endParaRPr lang="de-DE" sz="2400" dirty="0"/>
                     </a:p>
@@ -16131,8 +16133,8 @@
                     <a:p>
                       <a:pPr lvl="0" algn="ctr"/>
                       <a:r>
-                        <a:rPr lang="de-DE" sz="2400" dirty="0" smtClean="0"/>
-                        <a:t>0.02</a:t>
+                        <a:rPr lang="de-DE" sz="2400" smtClean="0"/>
+                        <a:t>0.014</a:t>
                       </a:r>
                       <a:endParaRPr lang="de-DE" sz="2400" dirty="0"/>
                     </a:p>
@@ -16146,8 +16148,8 @@
                     <a:p>
                       <a:pPr lvl="0" algn="ctr"/>
                       <a:r>
-                        <a:rPr lang="de-DE" sz="2400" dirty="0" smtClean="0"/>
-                        <a:t>0.45</a:t>
+                        <a:rPr lang="de-DE" sz="2400" smtClean="0"/>
+                        <a:t>0.464</a:t>
                       </a:r>
                       <a:endParaRPr lang="de-DE" sz="2400" dirty="0"/>
                     </a:p>
@@ -16177,9 +16179,10 @@
                         <a:defRPr/>
                       </a:pPr>
                       <a:r>
-                        <a:rPr lang="de-DE" sz="2400" dirty="0" smtClean="0"/>
-                        <a:t>0.45</a:t>
+                        <a:rPr lang="de-DE" sz="2400" smtClean="0"/>
+                        <a:t>0.464</a:t>
                       </a:r>
+                      <a:endParaRPr lang="de-DE" sz="2400" dirty="0" smtClean="0"/>
                     </a:p>
                   </a:txBody>
                   <a:tcPr/>
@@ -16191,8 +16194,8 @@
                     <a:p>
                       <a:pPr lvl="0" algn="ctr"/>
                       <a:r>
-                        <a:rPr lang="de-DE" sz="2400" dirty="0" smtClean="0"/>
-                        <a:t>0.02</a:t>
+                        <a:rPr lang="de-DE" sz="2400" smtClean="0"/>
+                        <a:t>0.014</a:t>
                       </a:r>
                       <a:endParaRPr lang="de-DE" sz="2400" dirty="0"/>
                     </a:p>
@@ -16206,8 +16209,8 @@
                     <a:p>
                       <a:pPr lvl="0" algn="ctr"/>
                       <a:r>
-                        <a:rPr lang="de-DE" sz="2400" dirty="0" smtClean="0"/>
-                        <a:t>0.02</a:t>
+                        <a:rPr lang="de-DE" sz="2400" smtClean="0"/>
+                        <a:t>0.014</a:t>
                       </a:r>
                       <a:endParaRPr lang="de-DE" sz="2400" dirty="0"/>
                     </a:p>
@@ -16215,7 +16218,7 @@
                   <a:tcPr/>
                 </a:tc>
               </a:tr>
-              <a:tr h="496610">
+              <a:tr h="507577">
                 <a:tc>
                   <a:txBody>
                     <a:bodyPr/>
@@ -16242,8 +16245,8 @@
                     <a:p>
                       <a:pPr lvl="0" algn="ctr"/>
                       <a:r>
-                        <a:rPr lang="de-DE" sz="2400" dirty="0" smtClean="0"/>
-                        <a:t>0.02</a:t>
+                        <a:rPr lang="de-DE" sz="2400" smtClean="0"/>
+                        <a:t>0.014</a:t>
                       </a:r>
                       <a:endParaRPr lang="de-DE" sz="2400" dirty="0"/>
                     </a:p>
@@ -16257,8 +16260,8 @@
                     <a:p>
                       <a:pPr lvl="0" algn="ctr"/>
                       <a:r>
-                        <a:rPr lang="de-DE" sz="2400" dirty="0" smtClean="0"/>
-                        <a:t>0.02</a:t>
+                        <a:rPr lang="de-DE" sz="2400" smtClean="0"/>
+                        <a:t>0.014</a:t>
                       </a:r>
                       <a:endParaRPr lang="de-DE" sz="2400" dirty="0"/>
                     </a:p>
@@ -16272,8 +16275,8 @@
                     <a:p>
                       <a:pPr lvl="0" algn="ctr"/>
                       <a:r>
-                        <a:rPr lang="de-DE" sz="2400" dirty="0" smtClean="0"/>
-                        <a:t>0.02</a:t>
+                        <a:rPr lang="de-DE" sz="2400" smtClean="0"/>
+                        <a:t>0.014</a:t>
                       </a:r>
                       <a:endParaRPr lang="de-DE" sz="2400" dirty="0"/>
                     </a:p>
@@ -16287,8 +16290,8 @@
                     <a:p>
                       <a:pPr lvl="0" algn="ctr"/>
                       <a:r>
-                        <a:rPr lang="de-DE" sz="2400" dirty="0" smtClean="0"/>
-                        <a:t>0.02</a:t>
+                        <a:rPr lang="de-DE" sz="2400" smtClean="0"/>
+                        <a:t>0.014</a:t>
                       </a:r>
                       <a:endParaRPr lang="de-DE" sz="2400" dirty="0"/>
                     </a:p>
@@ -16302,8 +16305,8 @@
                     <a:p>
                       <a:pPr lvl="0" algn="ctr"/>
                       <a:r>
-                        <a:rPr lang="de-DE" sz="2400" dirty="0" smtClean="0"/>
-                        <a:t>0.02</a:t>
+                        <a:rPr lang="de-DE" sz="2400" smtClean="0"/>
+                        <a:t>0.014</a:t>
                       </a:r>
                       <a:endParaRPr lang="de-DE" sz="2400" dirty="0"/>
                     </a:p>
@@ -16317,8 +16320,8 @@
                     <a:p>
                       <a:pPr lvl="0" algn="ctr"/>
                       <a:r>
-                        <a:rPr lang="de-DE" sz="2400" dirty="0" smtClean="0"/>
-                        <a:t>0.02</a:t>
+                        <a:rPr lang="de-DE" sz="2400" smtClean="0"/>
+                        <a:t>0.014</a:t>
                       </a:r>
                       <a:endParaRPr lang="de-DE" sz="2400" dirty="0"/>
                     </a:p>
@@ -16332,8 +16335,8 @@
                     <a:p>
                       <a:pPr lvl="0" algn="ctr"/>
                       <a:r>
-                        <a:rPr lang="de-DE" sz="2400" dirty="0" smtClean="0"/>
-                        <a:t>0.88</a:t>
+                        <a:rPr lang="de-DE" sz="2400" smtClean="0"/>
+                        <a:t>0.914</a:t>
                       </a:r>
                       <a:endParaRPr lang="de-DE" sz="2400" dirty="0"/>
                     </a:p>
@@ -16341,7 +16344,7 @@
                   <a:tcPr/>
                 </a:tc>
               </a:tr>
-              <a:tr h="496610">
+              <a:tr h="507577">
                 <a:tc>
                   <a:txBody>
                     <a:bodyPr/>
@@ -16368,8 +16371,8 @@
                     <a:p>
                       <a:pPr lvl="0" algn="ctr"/>
                       <a:r>
-                        <a:rPr lang="de-DE" sz="2400" dirty="0" smtClean="0"/>
-                        <a:t>0.02</a:t>
+                        <a:rPr lang="de-DE" sz="2400" smtClean="0"/>
+                        <a:t>0.014</a:t>
                       </a:r>
                       <a:endParaRPr lang="de-DE" sz="2400" dirty="0"/>
                     </a:p>
@@ -16383,8 +16386,8 @@
                     <a:p>
                       <a:pPr lvl="0" algn="ctr"/>
                       <a:r>
-                        <a:rPr lang="de-DE" sz="2400" dirty="0" smtClean="0"/>
-                        <a:t>0.02</a:t>
+                        <a:rPr lang="de-DE" sz="2400" smtClean="0"/>
+                        <a:t>0.014</a:t>
                       </a:r>
                       <a:endParaRPr lang="de-DE" sz="2400" dirty="0"/>
                     </a:p>
@@ -16398,8 +16401,8 @@
                     <a:p>
                       <a:pPr lvl="0" algn="ctr"/>
                       <a:r>
-                        <a:rPr lang="de-DE" sz="2400" dirty="0" smtClean="0"/>
-                        <a:t>0.02</a:t>
+                        <a:rPr lang="de-DE" sz="2400" smtClean="0"/>
+                        <a:t>0.014</a:t>
                       </a:r>
                       <a:endParaRPr lang="de-DE" sz="2400" dirty="0"/>
                     </a:p>
@@ -16413,8 +16416,8 @@
                     <a:p>
                       <a:pPr lvl="0" algn="ctr"/>
                       <a:r>
-                        <a:rPr lang="de-DE" sz="2400" dirty="0" smtClean="0"/>
-                        <a:t>0.02</a:t>
+                        <a:rPr lang="de-DE" sz="2400" smtClean="0"/>
+                        <a:t>0.014</a:t>
                       </a:r>
                       <a:endParaRPr lang="de-DE" sz="2400" dirty="0"/>
                     </a:p>
@@ -16428,8 +16431,8 @@
                     <a:p>
                       <a:pPr lvl="0" algn="ctr"/>
                       <a:r>
-                        <a:rPr lang="de-DE" sz="2400" dirty="0" smtClean="0"/>
-                        <a:t>0.02</a:t>
+                        <a:rPr lang="de-DE" sz="2400" smtClean="0"/>
+                        <a:t>0.014</a:t>
                       </a:r>
                       <a:endParaRPr lang="de-DE" sz="2400" dirty="0"/>
                     </a:p>
@@ -16443,8 +16446,8 @@
                     <a:p>
                       <a:pPr lvl="0" algn="ctr"/>
                       <a:r>
-                        <a:rPr lang="de-DE" sz="2400" dirty="0" smtClean="0"/>
-                        <a:t>0.45</a:t>
+                        <a:rPr lang="de-DE" sz="2400" smtClean="0"/>
+                        <a:t>0.464</a:t>
                       </a:r>
                       <a:endParaRPr lang="de-DE" sz="2400" dirty="0"/>
                     </a:p>
@@ -16458,8 +16461,8 @@
                     <a:p>
                       <a:pPr lvl="0" algn="ctr"/>
                       <a:r>
-                        <a:rPr lang="de-DE" sz="2400" dirty="0" smtClean="0"/>
-                        <a:t>0.45</a:t>
+                        <a:rPr lang="de-DE" sz="2400" smtClean="0"/>
+                        <a:t>0.464</a:t>
                       </a:r>
                       <a:endParaRPr lang="de-DE" sz="2400" dirty="0"/>
                     </a:p>
@@ -16467,7 +16470,7 @@
                   <a:tcPr/>
                 </a:tc>
               </a:tr>
-              <a:tr h="496610">
+              <a:tr h="507577">
                 <a:tc>
                   <a:txBody>
                     <a:bodyPr/>
@@ -16494,8 +16497,8 @@
                     <a:p>
                       <a:pPr lvl="0" algn="ctr"/>
                       <a:r>
-                        <a:rPr lang="de-DE" sz="2400" dirty="0" smtClean="0"/>
-                        <a:t>0.02</a:t>
+                        <a:rPr lang="de-DE" sz="2400" smtClean="0"/>
+                        <a:t>0.014</a:t>
                       </a:r>
                       <a:endParaRPr lang="de-DE" sz="2400" dirty="0"/>
                     </a:p>
@@ -16509,8 +16512,8 @@
                     <a:p>
                       <a:pPr lvl="0" algn="ctr"/>
                       <a:r>
-                        <a:rPr lang="de-DE" sz="2400" dirty="0" smtClean="0"/>
-                        <a:t>0.02</a:t>
+                        <a:rPr lang="de-DE" sz="2400" smtClean="0"/>
+                        <a:t>0.014</a:t>
                       </a:r>
                       <a:endParaRPr lang="de-DE" sz="2400" dirty="0"/>
                     </a:p>
@@ -16524,8 +16527,8 @@
                     <a:p>
                       <a:pPr lvl="0" algn="ctr"/>
                       <a:r>
-                        <a:rPr lang="de-DE" sz="2400" dirty="0" smtClean="0"/>
-                        <a:t>0.02</a:t>
+                        <a:rPr lang="de-DE" sz="2400" smtClean="0"/>
+                        <a:t>0.014</a:t>
                       </a:r>
                       <a:endParaRPr lang="de-DE" sz="2400" dirty="0"/>
                     </a:p>
@@ -16555,9 +16558,10 @@
                         <a:defRPr/>
                       </a:pPr>
                       <a:r>
-                        <a:rPr lang="de-DE" sz="2400" dirty="0" smtClean="0"/>
-                        <a:t>0.31</a:t>
+                        <a:rPr lang="de-DE" sz="2400" smtClean="0"/>
+                        <a:t>0.314</a:t>
                       </a:r>
+                      <a:endParaRPr lang="de-DE" sz="2400" dirty="0" smtClean="0"/>
                     </a:p>
                   </a:txBody>
                   <a:tcPr/>
@@ -16569,8 +16573,8 @@
                     <a:p>
                       <a:pPr lvl="0" algn="ctr"/>
                       <a:r>
-                        <a:rPr lang="de-DE" sz="2400" dirty="0" smtClean="0"/>
-                        <a:t>0.31</a:t>
+                        <a:rPr lang="de-DE" sz="2400" smtClean="0"/>
+                        <a:t>0.314</a:t>
                       </a:r>
                       <a:endParaRPr lang="de-DE" sz="2400" dirty="0"/>
                     </a:p>
@@ -16584,8 +16588,8 @@
                     <a:p>
                       <a:pPr lvl="0" algn="ctr"/>
                       <a:r>
-                        <a:rPr lang="de-DE" sz="2400" dirty="0" smtClean="0"/>
-                        <a:t>0.02</a:t>
+                        <a:rPr lang="de-DE" sz="2400" smtClean="0"/>
+                        <a:t>0.014</a:t>
                       </a:r>
                       <a:endParaRPr lang="de-DE" sz="2400" dirty="0"/>
                     </a:p>
@@ -16599,8 +16603,8 @@
                     <a:p>
                       <a:pPr lvl="0" algn="ctr"/>
                       <a:r>
-                        <a:rPr lang="de-DE" sz="2400" dirty="0" smtClean="0"/>
-                        <a:t>0.31</a:t>
+                        <a:rPr lang="de-DE" sz="2400" smtClean="0"/>
+                        <a:t>0.314</a:t>
                       </a:r>
                       <a:endParaRPr lang="de-DE" sz="2400" dirty="0"/>
                     </a:p>
@@ -16826,8 +16830,8 @@
           </a:p>
         </p:txBody>
       </p:sp>
-      <mc:AlternateContent xmlns:mc="http://schemas.openxmlformats.org/markup-compatibility/2006" xmlns:a14="http://schemas.microsoft.com/office/drawing/2010/main">
-        <mc:Choice Requires="a14">
+      <mc:AlternateContent xmlns:mc="http://schemas.openxmlformats.org/markup-compatibility/2006">
+        <mc:Choice xmlns:a14="http://schemas.microsoft.com/office/drawing/2010/main" Requires="a14">
           <p:sp>
             <p:nvSpPr>
               <p:cNvPr id="2" name="TextBox 1"/>
@@ -16836,7 +16840,7 @@
             </p:nvSpPr>
             <p:spPr>
               <a:xfrm>
-                <a:off x="571500" y="5949280"/>
+                <a:off x="571500" y="6056477"/>
                 <a:ext cx="7994650" cy="461665"/>
               </a:xfrm>
               <a:prstGeom prst="rect">
@@ -17013,7 +17017,7 @@
             </p:txBody>
           </p:sp>
         </mc:Choice>
-        <mc:Fallback xmlns="">
+        <mc:Fallback>
           <p:sp>
             <p:nvSpPr>
               <p:cNvPr id="2" name="TextBox 1"/>
@@ -17024,16 +17028,16 @@
             </p:nvSpPr>
             <p:spPr>
               <a:xfrm>
-                <a:off x="571500" y="5949280"/>
+                <a:off x="571500" y="6056477"/>
                 <a:ext cx="7994650" cy="461665"/>
               </a:xfrm>
               <a:prstGeom prst="rect">
                 <a:avLst/>
               </a:prstGeom>
-              <a:blipFill rotWithShape="0">
+              <a:blipFill rotWithShape="1">
                 <a:blip r:embed="rId3"/>
                 <a:stretch>
-                  <a:fillRect l="-1220" t="-11842" b="-27632"/>
+                  <a:fillRect l="-1220" t="-12000" b="-29333"/>
                 </a:stretch>
               </a:blipFill>
             </p:spPr>
@@ -27139,11 +27143,7 @@
             </a:r>
             <a:r>
               <a:rPr lang="en-US" dirty="0" smtClean="0"/>
-              <a:t> </a:t>
-            </a:r>
-            <a:r>
-              <a:rPr lang="en-US" dirty="0" smtClean="0"/>
-              <a:t>24.2</a:t>
+              <a:t> 24.2</a:t>
             </a:r>
             <a:endParaRPr lang="vi-VN" dirty="0"/>
           </a:p>
@@ -27605,11 +27605,7 @@
             </a:r>
             <a:r>
               <a:rPr lang="en-US" dirty="0" smtClean="0"/>
-              <a:t> </a:t>
-            </a:r>
-            <a:r>
-              <a:rPr lang="en-US" dirty="0" smtClean="0"/>
-              <a:t>24.3</a:t>
+              <a:t> 24.3</a:t>
             </a:r>
             <a:endParaRPr lang="vi-VN" dirty="0"/>
           </a:p>
@@ -28402,11 +28398,7 @@
             </a:r>
             <a:r>
               <a:rPr lang="en-US" dirty="0" smtClean="0"/>
-              <a:t> </a:t>
-            </a:r>
-            <a:r>
-              <a:rPr lang="en-US" dirty="0" smtClean="0"/>
-              <a:t>24.4</a:t>
+              <a:t> 24.4</a:t>
             </a:r>
             <a:endParaRPr lang="vi-VN" dirty="0"/>
           </a:p>
@@ -29063,11 +29055,7 @@
             </a:r>
             <a:r>
               <a:rPr lang="en-US" dirty="0" smtClean="0"/>
-              <a:t> </a:t>
-            </a:r>
-            <a:r>
-              <a:rPr lang="en-US" dirty="0" smtClean="0"/>
-              <a:t>24.5</a:t>
+              <a:t> 24.5</a:t>
             </a:r>
             <a:endParaRPr lang="vi-VN" dirty="0"/>
           </a:p>
@@ -29635,7 +29623,6 @@
               <a:rPr lang="en-US" dirty="0"/>
               <a:t> 1?</a:t>
             </a:r>
-            <a:endParaRPr lang="en-US" dirty="0"/>
           </a:p>
         </p:txBody>
       </p:sp>
@@ -35542,7 +35529,7 @@
   </a:extraClrSchemeLst>
   <a:extLst>
     <a:ext uri="{05A4C25C-085E-4340-85A3-A5531E510DB2}">
-      <thm15:themeFamily xmlns="" xmlns:thm15="http://schemas.microsoft.com/office/thememl/2012/main" name="Office Theme" id="{62F939B6-93AF-4DB8-9C6B-D6C7DFDC589F}" vid="{4A3C46E8-61CC-4603-A589-7422A47A8E4A}"/>
+      <thm15:themeFamily xmlns:thm15="http://schemas.microsoft.com/office/thememl/2012/main" xmlns="" name="Office Theme" id="{62F939B6-93AF-4DB8-9C6B-D6C7DFDC589F}" vid="{4A3C46E8-61CC-4603-A589-7422A47A8E4A}"/>
     </a:ext>
   </a:extLst>
 </a:theme>
@@ -35803,7 +35790,7 @@
   <a:extraClrSchemeLst/>
   <a:extLst>
     <a:ext uri="{05A4C25C-085E-4340-85A3-A5531E510DB2}">
-      <thm15:themeFamily xmlns="" xmlns:thm15="http://schemas.microsoft.com/office/thememl/2012/main" name="Office Theme" id="{62F939B6-93AF-4DB8-9C6B-D6C7DFDC589F}" vid="{4A3C46E8-61CC-4603-A589-7422A47A8E4A}"/>
+      <thm15:themeFamily xmlns:thm15="http://schemas.microsoft.com/office/thememl/2012/main" xmlns="" name="Office Theme" id="{62F939B6-93AF-4DB8-9C6B-D6C7DFDC589F}" vid="{4A3C46E8-61CC-4603-A589-7422A47A8E4A}"/>
     </a:ext>
   </a:extLst>
 </a:theme>

</xml_diff>

<commit_message>
Sua dk bai 24.4
</commit_message>
<xml_diff>
--- a/Bai 24 Phan tich lien ket, PageRank.pptx
+++ b/Bai 24 Phan tich lien ket, PageRank.pptx
@@ -11697,7 +11697,7 @@
           <a:graphicData uri="http://schemas.openxmlformats.org/presentationml/2006/ole">
             <mc:AlternateContent xmlns:mc="http://schemas.openxmlformats.org/markup-compatibility/2006">
               <mc:Choice xmlns:v="urn:schemas-microsoft-com:vml" Requires="v">
-                <p:oleObj spid="_x0000_s865508" name="Vergelijking" r:id="rId3" imgW="711000" imgH="304560" progId="Equation.3">
+                <p:oleObj spid="_x0000_s865510" name="Vergelijking" r:id="rId3" imgW="711000" imgH="304560" progId="Equation.3">
                   <p:embed/>
                 </p:oleObj>
               </mc:Choice>
@@ -16830,8 +16830,8 @@
           </a:p>
         </p:txBody>
       </p:sp>
-      <mc:AlternateContent xmlns:mc="http://schemas.openxmlformats.org/markup-compatibility/2006">
-        <mc:Choice xmlns:a14="http://schemas.microsoft.com/office/drawing/2010/main" Requires="a14">
+      <mc:AlternateContent xmlns:mc="http://schemas.openxmlformats.org/markup-compatibility/2006" xmlns:a14="http://schemas.microsoft.com/office/drawing/2010/main">
+        <mc:Choice Requires="a14">
           <p:sp>
             <p:nvSpPr>
               <p:cNvPr id="2" name="TextBox 1"/>
@@ -17017,7 +17017,7 @@
             </p:txBody>
           </p:sp>
         </mc:Choice>
-        <mc:Fallback>
+        <mc:Fallback xmlns="">
           <p:sp>
             <p:nvSpPr>
               <p:cNvPr id="2" name="TextBox 1"/>
@@ -29432,20 +29432,20 @@
               <a:t> </a:t>
             </a:r>
             <a:r>
-              <a:rPr lang="en-US" dirty="0" err="1"/>
+              <a:rPr lang="en-US" err="1"/>
               <a:t>hơn</a:t>
             </a:r>
             <a:r>
-              <a:rPr lang="en-US" dirty="0"/>
-              <a:t> </a:t>
-            </a:r>
-            <a:r>
-              <a:rPr lang="el-GR" dirty="0"/>
+              <a:rPr lang="en-US"/>
+              <a:t> </a:t>
+            </a:r>
+            <a:r>
+              <a:rPr lang="el-GR" smtClean="0"/>
               <a:t>α</a:t>
             </a:r>
             <a:r>
-              <a:rPr lang="en-US" dirty="0"/>
-              <a:t> </a:t>
+              <a:rPr lang="en-US" smtClean="0"/>
+              <a:t>/N </a:t>
             </a:r>
             <a:r>
               <a:rPr lang="en-US" dirty="0" err="1"/>

</xml_diff>

<commit_message>
Remove odp (due to layour error), very small update in Lesson 24
</commit_message>
<xml_diff>
--- a/Bai 24 Phan tich lien ket, PageRank.pptx
+++ b/Bai 24 Phan tich lien ket, PageRank.pptx
@@ -175,7 +175,7 @@
   </p:defaultTextStyle>
   <p:extLst>
     <p:ext uri="{EFAFB233-063F-42B5-8137-9DF3F51BA10A}">
-      <p15:sldGuideLst xmlns:p15="http://schemas.microsoft.com/office/powerpoint/2012/main" xmlns="">
+      <p15:sldGuideLst xmlns:p15="http://schemas.microsoft.com/office/powerpoint/2012/main">
         <p15:guide id="1" orient="horz" pos="2160">
           <p15:clr>
             <a:srgbClr val="A4A3A4"/>
@@ -189,7 +189,7 @@
       </p15:sldGuideLst>
     </p:ext>
     <p:ext uri="{2D200454-40CA-4A62-9FC3-DE9A4176ACB9}">
-      <p15:notesGuideLst xmlns:p15="http://schemas.microsoft.com/office/powerpoint/2012/main" xmlns="">
+      <p15:notesGuideLst xmlns:p15="http://schemas.microsoft.com/office/powerpoint/2012/main">
         <p15:guide id="1" orient="horz" pos="2880">
           <p15:clr>
             <a:srgbClr val="A4A3A4"/>
@@ -8487,8 +8487,8 @@
         </p:nvSpPr>
         <p:spPr>
           <a:xfrm>
-            <a:off x="539552" y="5589240"/>
-            <a:ext cx="8064896" cy="954107"/>
+            <a:off x="539552" y="5422321"/>
+            <a:ext cx="8064896" cy="1384995"/>
           </a:xfrm>
           <a:prstGeom prst="rect">
             <a:avLst/>
@@ -8502,12 +8502,86 @@
           <a:lstStyle/>
           <a:p>
             <a:r>
+              <a:rPr lang="en-US" sz="2800" dirty="0" err="1" smtClean="0">
+                <a:solidFill>
+                  <a:schemeClr val="tx2"/>
+                </a:solidFill>
+              </a:rPr>
+              <a:t>Mức</a:t>
+            </a:r>
+            <a:r>
+              <a:rPr lang="en-US" sz="2800" dirty="0" smtClean="0">
+                <a:solidFill>
+                  <a:schemeClr val="tx2"/>
+                </a:solidFill>
+              </a:rPr>
+              <a:t> </a:t>
+            </a:r>
+            <a:r>
+              <a:rPr lang="en-US" sz="2800" dirty="0" err="1" smtClean="0">
+                <a:solidFill>
+                  <a:schemeClr val="tx2"/>
+                </a:solidFill>
+              </a:rPr>
+              <a:t>đồng</a:t>
+            </a:r>
+            <a:r>
+              <a:rPr lang="en-US" sz="2800" dirty="0" smtClean="0">
+                <a:solidFill>
+                  <a:schemeClr val="tx2"/>
+                </a:solidFill>
+              </a:rPr>
+              <a:t> </a:t>
+            </a:r>
+            <a:r>
+              <a:rPr lang="en-US" sz="2800" dirty="0" err="1" smtClean="0">
+                <a:solidFill>
+                  <a:schemeClr val="tx2"/>
+                </a:solidFill>
+              </a:rPr>
+              <a:t>tham</a:t>
+            </a:r>
+            <a:r>
+              <a:rPr lang="en-US" sz="2800" dirty="0" smtClean="0">
+                <a:solidFill>
+                  <a:schemeClr val="tx2"/>
+                </a:solidFill>
+              </a:rPr>
+              <a:t> </a:t>
+            </a:r>
+            <a:r>
+              <a:rPr lang="en-US" sz="2800" dirty="0" err="1" smtClean="0">
+                <a:solidFill>
+                  <a:schemeClr val="tx2"/>
+                </a:solidFill>
+              </a:rPr>
+              <a:t>chiếu</a:t>
+            </a:r>
+            <a:r>
+              <a:rPr lang="en-US" sz="2800" dirty="0" smtClean="0">
+                <a:solidFill>
+                  <a:schemeClr val="tx2"/>
+                </a:solidFill>
+              </a:rPr>
+              <a:t>: Co-citation</a:t>
+            </a:r>
+          </a:p>
+          <a:p>
+            <a:r>
               <a:rPr lang="vi-VN" sz="2800" dirty="0" smtClean="0">
                 <a:solidFill>
                   <a:schemeClr val="tx2"/>
                 </a:solidFill>
               </a:rPr>
-              <a:t>Có nên chuẩn hóa theo</a:t>
+              <a:t>Có </a:t>
+            </a:r>
+            <a:r>
+              <a:rPr lang="vi-VN" sz="2800" dirty="0" smtClean="0">
+                <a:solidFill>
+                  <a:schemeClr val="tx2"/>
+                </a:solidFill>
+              </a:rPr>
+              <a:t>nên chuẩn hóa theo</a:t>
             </a:r>
             <a:r>
               <a:rPr lang="en-US" sz="2800" dirty="0" smtClean="0">
@@ -8526,20 +8600,44 @@
               <a:t>tổng</a:t>
             </a:r>
             <a:r>
+              <a:rPr lang="en-US" sz="2800" dirty="0" smtClean="0">
+                <a:solidFill>
+                  <a:schemeClr val="tx2"/>
+                </a:solidFill>
+              </a:rPr>
+              <a:t>:</a:t>
+            </a:r>
+            <a:r>
               <a:rPr lang="vi-VN" sz="2800" dirty="0" smtClean="0">
                 <a:solidFill>
                   <a:schemeClr val="tx2"/>
                 </a:solidFill>
               </a:rPr>
-              <a:t> số tài liệu trích dẫn A </a:t>
-            </a:r>
-            <a:r>
-              <a:rPr lang="en-US" sz="2800" dirty="0" err="1" smtClean="0">
+              <a:t> </a:t>
+            </a:r>
+            <a:r>
+              <a:rPr lang="en-US" sz="2800" dirty="0" smtClean="0">
                 <a:solidFill>
                   <a:schemeClr val="tx2"/>
                 </a:solidFill>
               </a:rPr>
-              <a:t>và</a:t>
+              <a:t>#</a:t>
+            </a:r>
+            <a:r>
+              <a:rPr lang="vi-VN" sz="2800" dirty="0" smtClean="0">
+                <a:solidFill>
+                  <a:schemeClr val="tx2"/>
+                </a:solidFill>
+              </a:rPr>
+              <a:t>tài </a:t>
+            </a:r>
+            <a:r>
+              <a:rPr lang="vi-VN" sz="2800" dirty="0" smtClean="0">
+                <a:solidFill>
+                  <a:schemeClr val="tx2"/>
+                </a:solidFill>
+              </a:rPr>
+              <a:t>liệu trích dẫn A </a:t>
             </a:r>
             <a:r>
               <a:rPr lang="en-US" sz="2800" dirty="0" smtClean="0">
@@ -8547,23 +8645,7 @@
                   <a:schemeClr val="tx2"/>
                 </a:solidFill>
               </a:rPr>
-              <a:t> </a:t>
-            </a:r>
-            <a:r>
-              <a:rPr lang="en-US" sz="2800" dirty="0" err="1" smtClean="0">
-                <a:solidFill>
-                  <a:schemeClr val="tx2"/>
-                </a:solidFill>
-              </a:rPr>
-              <a:t>số</a:t>
-            </a:r>
-            <a:r>
-              <a:rPr lang="en-US" sz="2800" dirty="0" smtClean="0">
-                <a:solidFill>
-                  <a:schemeClr val="tx2"/>
-                </a:solidFill>
-              </a:rPr>
-              <a:t> </a:t>
+              <a:t>+ #</a:t>
             </a:r>
             <a:r>
               <a:rPr lang="en-US" sz="2800" dirty="0" err="1" smtClean="0">
@@ -10108,22 +10190,6 @@
                   <a:schemeClr val="tx2"/>
                 </a:solidFill>
               </a:rPr>
-              <a:t>mở</a:t>
-            </a:r>
-            <a:r>
-              <a:rPr lang="en-US" sz="2400" dirty="0" smtClean="0">
-                <a:solidFill>
-                  <a:schemeClr val="tx2"/>
-                </a:solidFill>
-              </a:rPr>
-              <a:t> </a:t>
-            </a:r>
-            <a:r>
-              <a:rPr lang="en-US" sz="2400" dirty="0" err="1" smtClean="0">
-                <a:solidFill>
-                  <a:schemeClr val="tx2"/>
-                </a:solidFill>
-              </a:rPr>
               <a:t>ổn</a:t>
             </a:r>
             <a:r>
@@ -11697,7 +11763,7 @@
           <a:graphicData uri="http://schemas.openxmlformats.org/presentationml/2006/ole">
             <mc:AlternateContent xmlns:mc="http://schemas.openxmlformats.org/markup-compatibility/2006">
               <mc:Choice xmlns:v="urn:schemas-microsoft-com:vml" Requires="v">
-                <p:oleObj spid="_x0000_s865510" name="Vergelijking" r:id="rId3" imgW="711000" imgH="304560" progId="Equation.3">
+                <p:oleObj spid="_x0000_s865512" name="Vergelijking" r:id="rId3" imgW="711000" imgH="304560" progId="Equation.3">
                   <p:embed/>
                 </p:oleObj>
               </mc:Choice>
@@ -12110,14 +12176,62 @@
                 <a:tableStyleId>{2D5ABB26-0587-4C30-8999-92F81FD0307C}</a:tableStyleId>
               </a:tblPr>
               <a:tblGrid>
-                <a:gridCol w="634012"/>
-                <a:gridCol w="634012"/>
-                <a:gridCol w="634025"/>
-                <a:gridCol w="634000"/>
-                <a:gridCol w="634012"/>
-                <a:gridCol w="634012"/>
-                <a:gridCol w="634012"/>
-                <a:gridCol w="634012"/>
+                <a:gridCol w="634012">
+                  <a:extLst>
+                    <a:ext uri="{9D8B030D-6E8A-4147-A177-3AD203B41FA5}">
+                      <a16:colId xmlns:a16="http://schemas.microsoft.com/office/drawing/2014/main" val="20000"/>
+                    </a:ext>
+                  </a:extLst>
+                </a:gridCol>
+                <a:gridCol w="634012">
+                  <a:extLst>
+                    <a:ext uri="{9D8B030D-6E8A-4147-A177-3AD203B41FA5}">
+                      <a16:colId xmlns:a16="http://schemas.microsoft.com/office/drawing/2014/main" val="20001"/>
+                    </a:ext>
+                  </a:extLst>
+                </a:gridCol>
+                <a:gridCol w="634025">
+                  <a:extLst>
+                    <a:ext uri="{9D8B030D-6E8A-4147-A177-3AD203B41FA5}">
+                      <a16:colId xmlns:a16="http://schemas.microsoft.com/office/drawing/2014/main" val="20002"/>
+                    </a:ext>
+                  </a:extLst>
+                </a:gridCol>
+                <a:gridCol w="634000">
+                  <a:extLst>
+                    <a:ext uri="{9D8B030D-6E8A-4147-A177-3AD203B41FA5}">
+                      <a16:colId xmlns:a16="http://schemas.microsoft.com/office/drawing/2014/main" val="20003"/>
+                    </a:ext>
+                  </a:extLst>
+                </a:gridCol>
+                <a:gridCol w="634012">
+                  <a:extLst>
+                    <a:ext uri="{9D8B030D-6E8A-4147-A177-3AD203B41FA5}">
+                      <a16:colId xmlns:a16="http://schemas.microsoft.com/office/drawing/2014/main" val="20004"/>
+                    </a:ext>
+                  </a:extLst>
+                </a:gridCol>
+                <a:gridCol w="634012">
+                  <a:extLst>
+                    <a:ext uri="{9D8B030D-6E8A-4147-A177-3AD203B41FA5}">
+                      <a16:colId xmlns:a16="http://schemas.microsoft.com/office/drawing/2014/main" val="20005"/>
+                    </a:ext>
+                  </a:extLst>
+                </a:gridCol>
+                <a:gridCol w="634012">
+                  <a:extLst>
+                    <a:ext uri="{9D8B030D-6E8A-4147-A177-3AD203B41FA5}">
+                      <a16:colId xmlns:a16="http://schemas.microsoft.com/office/drawing/2014/main" val="20006"/>
+                    </a:ext>
+                  </a:extLst>
+                </a:gridCol>
+                <a:gridCol w="634012">
+                  <a:extLst>
+                    <a:ext uri="{9D8B030D-6E8A-4147-A177-3AD203B41FA5}">
+                      <a16:colId xmlns:a16="http://schemas.microsoft.com/office/drawing/2014/main" val="20007"/>
+                    </a:ext>
+                  </a:extLst>
+                </a:gridCol>
               </a:tblGrid>
               <a:tr h="223244">
                 <a:tc>
@@ -12264,6 +12378,11 @@
                   </a:txBody>
                   <a:tcPr/>
                 </a:tc>
+                <a:extLst>
+                  <a:ext uri="{0D108BD9-81ED-4DB2-BD59-A6C34878D82A}">
+                    <a16:rowId xmlns:a16="http://schemas.microsoft.com/office/drawing/2014/main" val="10000"/>
+                  </a:ext>
+                </a:extLst>
               </a:tr>
               <a:tr h="223244">
                 <a:tc>
@@ -12390,6 +12509,11 @@
                   </a:txBody>
                   <a:tcPr/>
                 </a:tc>
+                <a:extLst>
+                  <a:ext uri="{0D108BD9-81ED-4DB2-BD59-A6C34878D82A}">
+                    <a16:rowId xmlns:a16="http://schemas.microsoft.com/office/drawing/2014/main" val="10001"/>
+                  </a:ext>
+                </a:extLst>
               </a:tr>
               <a:tr h="223244">
                 <a:tc>
@@ -12546,6 +12670,11 @@
                   </a:txBody>
                   <a:tcPr/>
                 </a:tc>
+                <a:extLst>
+                  <a:ext uri="{0D108BD9-81ED-4DB2-BD59-A6C34878D82A}">
+                    <a16:rowId xmlns:a16="http://schemas.microsoft.com/office/drawing/2014/main" val="10002"/>
+                  </a:ext>
+                </a:extLst>
               </a:tr>
               <a:tr h="223244">
                 <a:tc>
@@ -12672,6 +12801,11 @@
                   </a:txBody>
                   <a:tcPr/>
                 </a:tc>
+                <a:extLst>
+                  <a:ext uri="{0D108BD9-81ED-4DB2-BD59-A6C34878D82A}">
+                    <a16:rowId xmlns:a16="http://schemas.microsoft.com/office/drawing/2014/main" val="10003"/>
+                  </a:ext>
+                </a:extLst>
               </a:tr>
               <a:tr h="223244">
                 <a:tc>
@@ -12813,6 +12947,11 @@
                   </a:txBody>
                   <a:tcPr/>
                 </a:tc>
+                <a:extLst>
+                  <a:ext uri="{0D108BD9-81ED-4DB2-BD59-A6C34878D82A}">
+                    <a16:rowId xmlns:a16="http://schemas.microsoft.com/office/drawing/2014/main" val="10004"/>
+                  </a:ext>
+                </a:extLst>
               </a:tr>
               <a:tr h="223244">
                 <a:tc>
@@ -12939,6 +13078,11 @@
                   </a:txBody>
                   <a:tcPr/>
                 </a:tc>
+                <a:extLst>
+                  <a:ext uri="{0D108BD9-81ED-4DB2-BD59-A6C34878D82A}">
+                    <a16:rowId xmlns:a16="http://schemas.microsoft.com/office/drawing/2014/main" val="10005"/>
+                  </a:ext>
+                </a:extLst>
               </a:tr>
               <a:tr h="223244">
                 <a:tc>
@@ -13065,6 +13209,11 @@
                   </a:txBody>
                   <a:tcPr/>
                 </a:tc>
+                <a:extLst>
+                  <a:ext uri="{0D108BD9-81ED-4DB2-BD59-A6C34878D82A}">
+                    <a16:rowId xmlns:a16="http://schemas.microsoft.com/office/drawing/2014/main" val="10006"/>
+                  </a:ext>
+                </a:extLst>
               </a:tr>
               <a:tr h="223244">
                 <a:tc>
@@ -13206,6 +13355,11 @@
                   </a:txBody>
                   <a:tcPr/>
                 </a:tc>
+                <a:extLst>
+                  <a:ext uri="{0D108BD9-81ED-4DB2-BD59-A6C34878D82A}">
+                    <a16:rowId xmlns:a16="http://schemas.microsoft.com/office/drawing/2014/main" val="10007"/>
+                  </a:ext>
+                </a:extLst>
               </a:tr>
             </a:tbl>
           </a:graphicData>
@@ -13878,14 +14032,62 @@
                 <a:tableStyleId>{2D5ABB26-0587-4C30-8999-92F81FD0307C}</a:tableStyleId>
               </a:tblPr>
               <a:tblGrid>
-                <a:gridCol w="857256"/>
-                <a:gridCol w="857256"/>
-                <a:gridCol w="857273"/>
-                <a:gridCol w="857239"/>
-                <a:gridCol w="857256"/>
-                <a:gridCol w="857256"/>
-                <a:gridCol w="857256"/>
-                <a:gridCol w="857256"/>
+                <a:gridCol w="857256">
+                  <a:extLst>
+                    <a:ext uri="{9D8B030D-6E8A-4147-A177-3AD203B41FA5}">
+                      <a16:colId xmlns:a16="http://schemas.microsoft.com/office/drawing/2014/main" val="20000"/>
+                    </a:ext>
+                  </a:extLst>
+                </a:gridCol>
+                <a:gridCol w="857256">
+                  <a:extLst>
+                    <a:ext uri="{9D8B030D-6E8A-4147-A177-3AD203B41FA5}">
+                      <a16:colId xmlns:a16="http://schemas.microsoft.com/office/drawing/2014/main" val="20001"/>
+                    </a:ext>
+                  </a:extLst>
+                </a:gridCol>
+                <a:gridCol w="857273">
+                  <a:extLst>
+                    <a:ext uri="{9D8B030D-6E8A-4147-A177-3AD203B41FA5}">
+                      <a16:colId xmlns:a16="http://schemas.microsoft.com/office/drawing/2014/main" val="20002"/>
+                    </a:ext>
+                  </a:extLst>
+                </a:gridCol>
+                <a:gridCol w="857239">
+                  <a:extLst>
+                    <a:ext uri="{9D8B030D-6E8A-4147-A177-3AD203B41FA5}">
+                      <a16:colId xmlns:a16="http://schemas.microsoft.com/office/drawing/2014/main" val="20003"/>
+                    </a:ext>
+                  </a:extLst>
+                </a:gridCol>
+                <a:gridCol w="857256">
+                  <a:extLst>
+                    <a:ext uri="{9D8B030D-6E8A-4147-A177-3AD203B41FA5}">
+                      <a16:colId xmlns:a16="http://schemas.microsoft.com/office/drawing/2014/main" val="20004"/>
+                    </a:ext>
+                  </a:extLst>
+                </a:gridCol>
+                <a:gridCol w="857256">
+                  <a:extLst>
+                    <a:ext uri="{9D8B030D-6E8A-4147-A177-3AD203B41FA5}">
+                      <a16:colId xmlns:a16="http://schemas.microsoft.com/office/drawing/2014/main" val="20005"/>
+                    </a:ext>
+                  </a:extLst>
+                </a:gridCol>
+                <a:gridCol w="857256">
+                  <a:extLst>
+                    <a:ext uri="{9D8B030D-6E8A-4147-A177-3AD203B41FA5}">
+                      <a16:colId xmlns:a16="http://schemas.microsoft.com/office/drawing/2014/main" val="20006"/>
+                    </a:ext>
+                  </a:extLst>
+                </a:gridCol>
+                <a:gridCol w="857256">
+                  <a:extLst>
+                    <a:ext uri="{9D8B030D-6E8A-4147-A177-3AD203B41FA5}">
+                      <a16:colId xmlns:a16="http://schemas.microsoft.com/office/drawing/2014/main" val="20007"/>
+                    </a:ext>
+                  </a:extLst>
+                </a:gridCol>
               </a:tblGrid>
               <a:tr h="496610">
                 <a:tc>
@@ -14032,6 +14234,11 @@
                   </a:txBody>
                   <a:tcPr/>
                 </a:tc>
+                <a:extLst>
+                  <a:ext uri="{0D108BD9-81ED-4DB2-BD59-A6C34878D82A}">
+                    <a16:rowId xmlns:a16="http://schemas.microsoft.com/office/drawing/2014/main" val="10000"/>
+                  </a:ext>
+                </a:extLst>
               </a:tr>
               <a:tr h="496610">
                 <a:tc>
@@ -14158,6 +14365,11 @@
                   </a:txBody>
                   <a:tcPr/>
                 </a:tc>
+                <a:extLst>
+                  <a:ext uri="{0D108BD9-81ED-4DB2-BD59-A6C34878D82A}">
+                    <a16:rowId xmlns:a16="http://schemas.microsoft.com/office/drawing/2014/main" val="10001"/>
+                  </a:ext>
+                </a:extLst>
               </a:tr>
               <a:tr h="496610">
                 <a:tc>
@@ -14314,6 +14526,11 @@
                   </a:txBody>
                   <a:tcPr/>
                 </a:tc>
+                <a:extLst>
+                  <a:ext uri="{0D108BD9-81ED-4DB2-BD59-A6C34878D82A}">
+                    <a16:rowId xmlns:a16="http://schemas.microsoft.com/office/drawing/2014/main" val="10002"/>
+                  </a:ext>
+                </a:extLst>
               </a:tr>
               <a:tr h="496610">
                 <a:tc>
@@ -14440,6 +14657,11 @@
                   </a:txBody>
                   <a:tcPr/>
                 </a:tc>
+                <a:extLst>
+                  <a:ext uri="{0D108BD9-81ED-4DB2-BD59-A6C34878D82A}">
+                    <a16:rowId xmlns:a16="http://schemas.microsoft.com/office/drawing/2014/main" val="10003"/>
+                  </a:ext>
+                </a:extLst>
               </a:tr>
               <a:tr h="496610">
                 <a:tc>
@@ -14580,6 +14802,11 @@
                   </a:txBody>
                   <a:tcPr/>
                 </a:tc>
+                <a:extLst>
+                  <a:ext uri="{0D108BD9-81ED-4DB2-BD59-A6C34878D82A}">
+                    <a16:rowId xmlns:a16="http://schemas.microsoft.com/office/drawing/2014/main" val="10004"/>
+                  </a:ext>
+                </a:extLst>
               </a:tr>
               <a:tr h="496610">
                 <a:tc>
@@ -14706,6 +14933,11 @@
                   </a:txBody>
                   <a:tcPr/>
                 </a:tc>
+                <a:extLst>
+                  <a:ext uri="{0D108BD9-81ED-4DB2-BD59-A6C34878D82A}">
+                    <a16:rowId xmlns:a16="http://schemas.microsoft.com/office/drawing/2014/main" val="10005"/>
+                  </a:ext>
+                </a:extLst>
               </a:tr>
               <a:tr h="496610">
                 <a:tc>
@@ -14832,6 +15064,11 @@
                   </a:txBody>
                   <a:tcPr/>
                 </a:tc>
+                <a:extLst>
+                  <a:ext uri="{0D108BD9-81ED-4DB2-BD59-A6C34878D82A}">
+                    <a16:rowId xmlns:a16="http://schemas.microsoft.com/office/drawing/2014/main" val="10006"/>
+                  </a:ext>
+                </a:extLst>
               </a:tr>
               <a:tr h="496610">
                 <a:tc>
@@ -14973,6 +15210,11 @@
                   </a:txBody>
                   <a:tcPr/>
                 </a:tc>
+                <a:extLst>
+                  <a:ext uri="{0D108BD9-81ED-4DB2-BD59-A6C34878D82A}">
+                    <a16:rowId xmlns:a16="http://schemas.microsoft.com/office/drawing/2014/main" val="10007"/>
+                  </a:ext>
+                </a:extLst>
               </a:tr>
             </a:tbl>
           </a:graphicData>
@@ -15511,14 +15753,62 @@
                 <a:tableStyleId>{2D5ABB26-0587-4C30-8999-92F81FD0307C}</a:tableStyleId>
               </a:tblPr>
               <a:tblGrid>
-                <a:gridCol w="1031122"/>
-                <a:gridCol w="1031122"/>
-                <a:gridCol w="1031141"/>
-                <a:gridCol w="1031100"/>
-                <a:gridCol w="1031122"/>
-                <a:gridCol w="1031122"/>
-                <a:gridCol w="1031122"/>
-                <a:gridCol w="1031122"/>
+                <a:gridCol w="1031122">
+                  <a:extLst>
+                    <a:ext uri="{9D8B030D-6E8A-4147-A177-3AD203B41FA5}">
+                      <a16:colId xmlns:a16="http://schemas.microsoft.com/office/drawing/2014/main" val="20000"/>
+                    </a:ext>
+                  </a:extLst>
+                </a:gridCol>
+                <a:gridCol w="1031122">
+                  <a:extLst>
+                    <a:ext uri="{9D8B030D-6E8A-4147-A177-3AD203B41FA5}">
+                      <a16:colId xmlns:a16="http://schemas.microsoft.com/office/drawing/2014/main" val="20001"/>
+                    </a:ext>
+                  </a:extLst>
+                </a:gridCol>
+                <a:gridCol w="1031141">
+                  <a:extLst>
+                    <a:ext uri="{9D8B030D-6E8A-4147-A177-3AD203B41FA5}">
+                      <a16:colId xmlns:a16="http://schemas.microsoft.com/office/drawing/2014/main" val="20002"/>
+                    </a:ext>
+                  </a:extLst>
+                </a:gridCol>
+                <a:gridCol w="1031100">
+                  <a:extLst>
+                    <a:ext uri="{9D8B030D-6E8A-4147-A177-3AD203B41FA5}">
+                      <a16:colId xmlns:a16="http://schemas.microsoft.com/office/drawing/2014/main" val="20003"/>
+                    </a:ext>
+                  </a:extLst>
+                </a:gridCol>
+                <a:gridCol w="1031122">
+                  <a:extLst>
+                    <a:ext uri="{9D8B030D-6E8A-4147-A177-3AD203B41FA5}">
+                      <a16:colId xmlns:a16="http://schemas.microsoft.com/office/drawing/2014/main" val="20004"/>
+                    </a:ext>
+                  </a:extLst>
+                </a:gridCol>
+                <a:gridCol w="1031122">
+                  <a:extLst>
+                    <a:ext uri="{9D8B030D-6E8A-4147-A177-3AD203B41FA5}">
+                      <a16:colId xmlns:a16="http://schemas.microsoft.com/office/drawing/2014/main" val="20005"/>
+                    </a:ext>
+                  </a:extLst>
+                </a:gridCol>
+                <a:gridCol w="1031122">
+                  <a:extLst>
+                    <a:ext uri="{9D8B030D-6E8A-4147-A177-3AD203B41FA5}">
+                      <a16:colId xmlns:a16="http://schemas.microsoft.com/office/drawing/2014/main" val="20006"/>
+                    </a:ext>
+                  </a:extLst>
+                </a:gridCol>
+                <a:gridCol w="1031122">
+                  <a:extLst>
+                    <a:ext uri="{9D8B030D-6E8A-4147-A177-3AD203B41FA5}">
+                      <a16:colId xmlns:a16="http://schemas.microsoft.com/office/drawing/2014/main" val="20007"/>
+                    </a:ext>
+                  </a:extLst>
+                </a:gridCol>
               </a:tblGrid>
               <a:tr h="507577">
                 <a:tc>
@@ -15665,6 +15955,11 @@
                   </a:txBody>
                   <a:tcPr/>
                 </a:tc>
+                <a:extLst>
+                  <a:ext uri="{0D108BD9-81ED-4DB2-BD59-A6C34878D82A}">
+                    <a16:rowId xmlns:a16="http://schemas.microsoft.com/office/drawing/2014/main" val="10000"/>
+                  </a:ext>
+                </a:extLst>
               </a:tr>
               <a:tr h="487413">
                 <a:tc>
@@ -15791,6 +16086,11 @@
                   </a:txBody>
                   <a:tcPr/>
                 </a:tc>
+                <a:extLst>
+                  <a:ext uri="{0D108BD9-81ED-4DB2-BD59-A6C34878D82A}">
+                    <a16:rowId xmlns:a16="http://schemas.microsoft.com/office/drawing/2014/main" val="10001"/>
+                  </a:ext>
+                </a:extLst>
               </a:tr>
               <a:tr h="507577">
                 <a:tc>
@@ -15949,6 +16249,11 @@
                   </a:txBody>
                   <a:tcPr/>
                 </a:tc>
+                <a:extLst>
+                  <a:ext uri="{0D108BD9-81ED-4DB2-BD59-A6C34878D82A}">
+                    <a16:rowId xmlns:a16="http://schemas.microsoft.com/office/drawing/2014/main" val="10002"/>
+                  </a:ext>
+                </a:extLst>
               </a:tr>
               <a:tr h="507577">
                 <a:tc>
@@ -16075,6 +16380,11 @@
                   </a:txBody>
                   <a:tcPr/>
                 </a:tc>
+                <a:extLst>
+                  <a:ext uri="{0D108BD9-81ED-4DB2-BD59-A6C34878D82A}">
+                    <a16:rowId xmlns:a16="http://schemas.microsoft.com/office/drawing/2014/main" val="10003"/>
+                  </a:ext>
+                </a:extLst>
               </a:tr>
               <a:tr h="507577">
                 <a:tc>
@@ -16217,6 +16527,11 @@
                   </a:txBody>
                   <a:tcPr/>
                 </a:tc>
+                <a:extLst>
+                  <a:ext uri="{0D108BD9-81ED-4DB2-BD59-A6C34878D82A}">
+                    <a16:rowId xmlns:a16="http://schemas.microsoft.com/office/drawing/2014/main" val="10004"/>
+                  </a:ext>
+                </a:extLst>
               </a:tr>
               <a:tr h="507577">
                 <a:tc>
@@ -16343,6 +16658,11 @@
                   </a:txBody>
                   <a:tcPr/>
                 </a:tc>
+                <a:extLst>
+                  <a:ext uri="{0D108BD9-81ED-4DB2-BD59-A6C34878D82A}">
+                    <a16:rowId xmlns:a16="http://schemas.microsoft.com/office/drawing/2014/main" val="10005"/>
+                  </a:ext>
+                </a:extLst>
               </a:tr>
               <a:tr h="507577">
                 <a:tc>
@@ -16469,6 +16789,11 @@
                   </a:txBody>
                   <a:tcPr/>
                 </a:tc>
+                <a:extLst>
+                  <a:ext uri="{0D108BD9-81ED-4DB2-BD59-A6C34878D82A}">
+                    <a16:rowId xmlns:a16="http://schemas.microsoft.com/office/drawing/2014/main" val="10006"/>
+                  </a:ext>
+                </a:extLst>
               </a:tr>
               <a:tr h="507577">
                 <a:tc>
@@ -16611,6 +16936,11 @@
                   </a:txBody>
                   <a:tcPr/>
                 </a:tc>
+                <a:extLst>
+                  <a:ext uri="{0D108BD9-81ED-4DB2-BD59-A6C34878D82A}">
+                    <a16:rowId xmlns:a16="http://schemas.microsoft.com/office/drawing/2014/main" val="10007"/>
+                  </a:ext>
+                </a:extLst>
               </a:tr>
             </a:tbl>
           </a:graphicData>
@@ -18755,7 +19085,7 @@
                         <m:chr m:val="⃗"/>
                         <m:ctrlPr>
                           <a:rPr lang="vi-VN" sz="2400" i="1" smtClean="0">
-                            <a:latin typeface="Cambria Math"/>
+                            <a:latin typeface="Cambria Math" panose="02040503050406030204" pitchFamily="18" charset="0"/>
                           </a:rPr>
                         </m:ctrlPr>
                       </m:accPr>
@@ -18887,7 +19217,7 @@
                         <m:chr m:val="⃗"/>
                         <m:ctrlPr>
                           <a:rPr lang="vi-VN" i="1">
-                            <a:latin typeface="Cambria Math"/>
+                            <a:latin typeface="Cambria Math" panose="02040503050406030204" pitchFamily="18" charset="0"/>
                           </a:rPr>
                         </m:ctrlPr>
                       </m:accPr>
@@ -19073,7 +19403,7 @@
                         <m:chr m:val="⃗"/>
                         <m:ctrlPr>
                           <a:rPr lang="vi-VN" i="1" smtClean="0">
-                            <a:latin typeface="Cambria Math"/>
+                            <a:latin typeface="Cambria Math" panose="02040503050406030204" pitchFamily="18" charset="0"/>
                           </a:rPr>
                         </m:ctrlPr>
                       </m:accPr>
@@ -19216,7 +19546,7 @@
                         <m:chr m:val="⃗"/>
                         <m:ctrlPr>
                           <a:rPr lang="en-US" i="1">
-                            <a:latin typeface="Cambria Math"/>
+                            <a:latin typeface="Cambria Math" panose="02040503050406030204" pitchFamily="18" charset="0"/>
                           </a:rPr>
                         </m:ctrlPr>
                       </m:accPr>
@@ -19245,7 +19575,7 @@
                         <m:chr m:val="⃗"/>
                         <m:ctrlPr>
                           <a:rPr lang="en-US" i="1">
-                            <a:latin typeface="Cambria Math"/>
+                            <a:latin typeface="Cambria Math" panose="02040503050406030204" pitchFamily="18" charset="0"/>
                           </a:rPr>
                         </m:ctrlPr>
                       </m:accPr>
@@ -19340,7 +19670,7 @@
                         <m:chr m:val="⃗"/>
                         <m:ctrlPr>
                           <a:rPr lang="en-US" i="1">
-                            <a:latin typeface="Cambria Math"/>
+                            <a:latin typeface="Cambria Math" panose="02040503050406030204" pitchFamily="18" charset="0"/>
                           </a:rPr>
                         </m:ctrlPr>
                       </m:accPr>
@@ -19366,7 +19696,7 @@
                         <m:chr m:val="⃗"/>
                         <m:ctrlPr>
                           <a:rPr lang="en-US" i="1">
-                            <a:latin typeface="Cambria Math"/>
+                            <a:latin typeface="Cambria Math" panose="02040503050406030204" pitchFamily="18" charset="0"/>
                           </a:rPr>
                         </m:ctrlPr>
                       </m:accPr>
@@ -20862,12 +21192,48 @@
                 <a:tableStyleId>{5FD0F851-EC5A-4D38-B0AD-8093EC10F338}</a:tableStyleId>
               </a:tblPr>
               <a:tblGrid>
-                <a:gridCol w="487201"/>
-                <a:gridCol w="1542807"/>
-                <a:gridCol w="1380406"/>
-                <a:gridCol w="1542779"/>
-                <a:gridCol w="1345323"/>
-                <a:gridCol w="1345323"/>
+                <a:gridCol w="487201">
+                  <a:extLst>
+                    <a:ext uri="{9D8B030D-6E8A-4147-A177-3AD203B41FA5}">
+                      <a16:colId xmlns:a16="http://schemas.microsoft.com/office/drawing/2014/main" val="20000"/>
+                    </a:ext>
+                  </a:extLst>
+                </a:gridCol>
+                <a:gridCol w="1542807">
+                  <a:extLst>
+                    <a:ext uri="{9D8B030D-6E8A-4147-A177-3AD203B41FA5}">
+                      <a16:colId xmlns:a16="http://schemas.microsoft.com/office/drawing/2014/main" val="20001"/>
+                    </a:ext>
+                  </a:extLst>
+                </a:gridCol>
+                <a:gridCol w="1380406">
+                  <a:extLst>
+                    <a:ext uri="{9D8B030D-6E8A-4147-A177-3AD203B41FA5}">
+                      <a16:colId xmlns:a16="http://schemas.microsoft.com/office/drawing/2014/main" val="20002"/>
+                    </a:ext>
+                  </a:extLst>
+                </a:gridCol>
+                <a:gridCol w="1542779">
+                  <a:extLst>
+                    <a:ext uri="{9D8B030D-6E8A-4147-A177-3AD203B41FA5}">
+                      <a16:colId xmlns:a16="http://schemas.microsoft.com/office/drawing/2014/main" val="20003"/>
+                    </a:ext>
+                  </a:extLst>
+                </a:gridCol>
+                <a:gridCol w="1345323">
+                  <a:extLst>
+                    <a:ext uri="{9D8B030D-6E8A-4147-A177-3AD203B41FA5}">
+                      <a16:colId xmlns:a16="http://schemas.microsoft.com/office/drawing/2014/main" val="20004"/>
+                    </a:ext>
+                  </a:extLst>
+                </a:gridCol>
+                <a:gridCol w="1345323">
+                  <a:extLst>
+                    <a:ext uri="{9D8B030D-6E8A-4147-A177-3AD203B41FA5}">
+                      <a16:colId xmlns:a16="http://schemas.microsoft.com/office/drawing/2014/main" val="20005"/>
+                    </a:ext>
+                  </a:extLst>
+                </a:gridCol>
               </a:tblGrid>
               <a:tr h="758737">
                 <a:tc>
@@ -21199,6 +21565,11 @@
                   </a:txBody>
                   <a:tcPr/>
                 </a:tc>
+                <a:extLst>
+                  <a:ext uri="{0D108BD9-81ED-4DB2-BD59-A6C34878D82A}">
+                    <a16:rowId xmlns:a16="http://schemas.microsoft.com/office/drawing/2014/main" val="10000"/>
+                  </a:ext>
+                </a:extLst>
               </a:tr>
               <a:tr h="738198">
                 <a:tc>
@@ -21655,6 +22026,11 @@
                     </a:solidFill>
                   </a:tcPr>
                 </a:tc>
+                <a:extLst>
+                  <a:ext uri="{0D108BD9-81ED-4DB2-BD59-A6C34878D82A}">
+                    <a16:rowId xmlns:a16="http://schemas.microsoft.com/office/drawing/2014/main" val="10001"/>
+                  </a:ext>
+                </a:extLst>
               </a:tr>
               <a:tr h="381000">
                 <a:tc>
@@ -22006,6 +22382,11 @@
                     </a:solidFill>
                   </a:tcPr>
                 </a:tc>
+                <a:extLst>
+                  <a:ext uri="{0D108BD9-81ED-4DB2-BD59-A6C34878D82A}">
+                    <a16:rowId xmlns:a16="http://schemas.microsoft.com/office/drawing/2014/main" val="10002"/>
+                  </a:ext>
+                </a:extLst>
               </a:tr>
               <a:tr h="381000">
                 <a:tc>
@@ -22348,6 +22729,11 @@
                     </a:solidFill>
                   </a:tcPr>
                 </a:tc>
+                <a:extLst>
+                  <a:ext uri="{0D108BD9-81ED-4DB2-BD59-A6C34878D82A}">
+                    <a16:rowId xmlns:a16="http://schemas.microsoft.com/office/drawing/2014/main" val="10003"/>
+                  </a:ext>
+                </a:extLst>
               </a:tr>
               <a:tr h="424893">
                 <a:tc>
@@ -22692,6 +23078,11 @@
                     </a:solidFill>
                   </a:tcPr>
                 </a:tc>
+                <a:extLst>
+                  <a:ext uri="{0D108BD9-81ED-4DB2-BD59-A6C34878D82A}">
+                    <a16:rowId xmlns:a16="http://schemas.microsoft.com/office/drawing/2014/main" val="10004"/>
+                  </a:ext>
+                </a:extLst>
               </a:tr>
               <a:tr h="424893">
                 <a:tc>
@@ -23036,6 +23427,11 @@
                     </a:solidFill>
                   </a:tcPr>
                 </a:tc>
+                <a:extLst>
+                  <a:ext uri="{0D108BD9-81ED-4DB2-BD59-A6C34878D82A}">
+                    <a16:rowId xmlns:a16="http://schemas.microsoft.com/office/drawing/2014/main" val="10005"/>
+                  </a:ext>
+                </a:extLst>
               </a:tr>
               <a:tr h="210498">
                 <a:tc>
@@ -23315,6 +23711,11 @@
                     </a:solidFill>
                   </a:tcPr>
                 </a:tc>
+                <a:extLst>
+                  <a:ext uri="{0D108BD9-81ED-4DB2-BD59-A6C34878D82A}">
+                    <a16:rowId xmlns:a16="http://schemas.microsoft.com/office/drawing/2014/main" val="10006"/>
+                  </a:ext>
+                </a:extLst>
               </a:tr>
               <a:tr h="424893">
                 <a:tc>
@@ -23641,6 +24042,11 @@
                     </a:solidFill>
                   </a:tcPr>
                 </a:tc>
+                <a:extLst>
+                  <a:ext uri="{0D108BD9-81ED-4DB2-BD59-A6C34878D82A}">
+                    <a16:rowId xmlns:a16="http://schemas.microsoft.com/office/drawing/2014/main" val="10007"/>
+                  </a:ext>
+                </a:extLst>
               </a:tr>
             </a:tbl>
           </a:graphicData>
@@ -24246,7 +24652,7 @@
                         <m:chr m:val="⃗"/>
                         <m:ctrlPr>
                           <a:rPr lang="en-US" sz="2000" i="1" smtClean="0">
-                            <a:latin typeface="Cambria Math"/>
+                            <a:latin typeface="Cambria Math" panose="02040503050406030204" pitchFamily="18" charset="0"/>
                           </a:rPr>
                         </m:ctrlPr>
                       </m:accPr>
@@ -34774,7 +35180,7 @@
         <p:spPr>
           <a:xfrm>
             <a:off x="611559" y="5373216"/>
-            <a:ext cx="8332415" cy="1015663"/>
+            <a:ext cx="8332415" cy="1446550"/>
           </a:xfrm>
           <a:prstGeom prst="rect">
             <a:avLst/>
@@ -34852,12 +35258,12 @@
               <a:t>: </a:t>
             </a:r>
             <a:r>
-              <a:rPr lang="en-US" sz="2800" dirty="0" err="1" smtClean="0">
+              <a:rPr lang="en-US" sz="2800" dirty="0" smtClean="0">
                 <a:solidFill>
                   <a:schemeClr val="tx2"/>
                 </a:solidFill>
               </a:rPr>
-              <a:t>cocitation</a:t>
+              <a:t>Bibliographic coupling</a:t>
             </a:r>
             <a:endParaRPr lang="en-US" sz="2800" dirty="0" smtClean="0">
               <a:solidFill>
@@ -34867,12 +35273,44 @@
           </a:p>
           <a:p>
             <a:r>
+              <a:rPr lang="vi-VN" sz="2800" dirty="0" smtClean="0">
+                <a:solidFill>
+                  <a:schemeClr val="tx2"/>
+                </a:solidFill>
+              </a:rPr>
+              <a:t>Có </a:t>
+            </a:r>
+            <a:r>
+              <a:rPr lang="vi-VN" sz="2800" dirty="0" smtClean="0">
+                <a:solidFill>
+                  <a:schemeClr val="tx2"/>
+                </a:solidFill>
+              </a:rPr>
+              <a:t>nên chuẩn hóa theo </a:t>
+            </a:r>
+            <a:r>
+              <a:rPr lang="en-US" sz="2800" dirty="0" err="1" smtClean="0">
+                <a:solidFill>
+                  <a:schemeClr val="tx2"/>
+                </a:solidFill>
+              </a:rPr>
+              <a:t>tổng</a:t>
+            </a:r>
+            <a:r>
               <a:rPr lang="en-US" sz="2800" dirty="0" smtClean="0">
                 <a:solidFill>
                   <a:schemeClr val="tx2"/>
                 </a:solidFill>
               </a:rPr>
-              <a:t>	</a:t>
+              <a:t>: </a:t>
+            </a:r>
+            <a:r>
+              <a:rPr lang="en-US" sz="2800" dirty="0" smtClean="0">
+                <a:solidFill>
+                  <a:schemeClr val="tx2"/>
+                </a:solidFill>
+              </a:rPr>
+              <a:t>#</a:t>
             </a:r>
             <a:r>
               <a:rPr lang="vi-VN" sz="2800" dirty="0" smtClean="0">
@@ -34880,7 +35318,79 @@
                   <a:schemeClr val="tx2"/>
                 </a:solidFill>
               </a:rPr>
-              <a:t>Có nên chuẩn hóa theo số lượng trích dẫn</a:t>
+              <a:t>trích dẫn</a:t>
+            </a:r>
+            <a:r>
+              <a:rPr lang="en-US" sz="2800" dirty="0" smtClean="0">
+                <a:solidFill>
+                  <a:schemeClr val="tx2"/>
+                </a:solidFill>
+              </a:rPr>
+              <a:t> </a:t>
+            </a:r>
+            <a:r>
+              <a:rPr lang="en-US" sz="2800" dirty="0" err="1" smtClean="0">
+                <a:solidFill>
+                  <a:schemeClr val="tx2"/>
+                </a:solidFill>
+              </a:rPr>
+              <a:t>trong</a:t>
+            </a:r>
+            <a:r>
+              <a:rPr lang="en-US" sz="2800" dirty="0" smtClean="0">
+                <a:solidFill>
+                  <a:schemeClr val="tx2"/>
+                </a:solidFill>
+              </a:rPr>
+              <a:t> A + #</a:t>
+            </a:r>
+            <a:r>
+              <a:rPr lang="en-US" sz="2800" dirty="0" err="1" smtClean="0">
+                <a:solidFill>
+                  <a:schemeClr val="tx2"/>
+                </a:solidFill>
+              </a:rPr>
+              <a:t>trích</a:t>
+            </a:r>
+            <a:r>
+              <a:rPr lang="en-US" sz="2800" dirty="0" smtClean="0">
+                <a:solidFill>
+                  <a:schemeClr val="tx2"/>
+                </a:solidFill>
+              </a:rPr>
+              <a:t> </a:t>
+            </a:r>
+            <a:r>
+              <a:rPr lang="en-US" sz="2800" dirty="0" err="1" smtClean="0">
+                <a:solidFill>
+                  <a:schemeClr val="tx2"/>
+                </a:solidFill>
+              </a:rPr>
+              <a:t>dẫn</a:t>
+            </a:r>
+            <a:r>
+              <a:rPr lang="en-US" sz="2800" dirty="0" smtClean="0">
+                <a:solidFill>
+                  <a:schemeClr val="tx2"/>
+                </a:solidFill>
+              </a:rPr>
+              <a:t> </a:t>
+            </a:r>
+            <a:r>
+              <a:rPr lang="en-US" sz="2800" dirty="0" err="1" smtClean="0">
+                <a:solidFill>
+                  <a:schemeClr val="tx2"/>
+                </a:solidFill>
+              </a:rPr>
+              <a:t>trong</a:t>
+            </a:r>
+            <a:r>
+              <a:rPr lang="en-US" sz="2800" dirty="0" smtClean="0">
+                <a:solidFill>
+                  <a:schemeClr val="tx2"/>
+                </a:solidFill>
+              </a:rPr>
+              <a:t> B</a:t>
             </a:r>
             <a:r>
               <a:rPr lang="vi-VN" sz="3200" dirty="0" smtClean="0">
@@ -35529,7 +36039,7 @@
   </a:extraClrSchemeLst>
   <a:extLst>
     <a:ext uri="{05A4C25C-085E-4340-85A3-A5531E510DB2}">
-      <thm15:themeFamily xmlns:thm15="http://schemas.microsoft.com/office/thememl/2012/main" xmlns="" name="Office Theme" id="{62F939B6-93AF-4DB8-9C6B-D6C7DFDC589F}" vid="{4A3C46E8-61CC-4603-A589-7422A47A8E4A}"/>
+      <thm15:themeFamily xmlns:thm15="http://schemas.microsoft.com/office/thememl/2012/main" name="Office Theme" id="{62F939B6-93AF-4DB8-9C6B-D6C7DFDC589F}" vid="{4A3C46E8-61CC-4603-A589-7422A47A8E4A}"/>
     </a:ext>
   </a:extLst>
 </a:theme>
@@ -35790,7 +36300,7 @@
   <a:extraClrSchemeLst/>
   <a:extLst>
     <a:ext uri="{05A4C25C-085E-4340-85A3-A5531E510DB2}">
-      <thm15:themeFamily xmlns:thm15="http://schemas.microsoft.com/office/thememl/2012/main" xmlns="" name="Office Theme" id="{62F939B6-93AF-4DB8-9C6B-D6C7DFDC589F}" vid="{4A3C46E8-61CC-4603-A589-7422A47A8E4A}"/>
+      <thm15:themeFamily xmlns:thm15="http://schemas.microsoft.com/office/thememl/2012/main" name="Office Theme" id="{62F939B6-93AF-4DB8-9C6B-D6C7DFDC589F}" vid="{4A3C46E8-61CC-4603-A589-7422A47A8E4A}"/>
     </a:ext>
   </a:extLst>
 </a:theme>

</xml_diff>